<commit_message>
Update report and presentation, and add new items
</commit_message>
<xml_diff>
--- a/presentation/presentation.pptx
+++ b/presentation/presentation.pptx
@@ -5,10 +5,10 @@
     <p:sldMasterId id="2147483648" r:id="rId1"/>
   </p:sldMasterIdLst>
   <p:notesMasterIdLst>
-    <p:notesMasterId r:id="rId9"/>
+    <p:notesMasterId r:id="rId11"/>
   </p:notesMasterIdLst>
   <p:handoutMasterIdLst>
-    <p:handoutMasterId r:id="rId10"/>
+    <p:handoutMasterId r:id="rId12"/>
   </p:handoutMasterIdLst>
   <p:sldIdLst>
     <p:sldId id="261" r:id="rId2"/>
@@ -18,6 +18,8 @@
     <p:sldId id="264" r:id="rId6"/>
     <p:sldId id="265" r:id="rId7"/>
     <p:sldId id="266" r:id="rId8"/>
+    <p:sldId id="267" r:id="rId9"/>
+    <p:sldId id="268" r:id="rId10"/>
   </p:sldIdLst>
   <p:sldSz cx="12192000" cy="6858000"/>
   <p:notesSz cx="6858000" cy="9144000"/>
@@ -220,7 +222,7 @@
           <a:p>
             <a:fld id="{59041DB8-B66F-4DC8-A96E-33677E0F90FF}" type="datetimeFigureOut">
               <a:rPr lang="en-US" smtClean="0"/>
-              <a:t>6/17/2018</a:t>
+              <a:t>6/18/2018</a:t>
             </a:fld>
             <a:endParaRPr lang="en-US"/>
           </a:p>
@@ -385,7 +387,7 @@
           <a:p>
             <a:fld id="{DEB49C4A-65AC-492D-9701-81B46C3AD0E4}" type="datetimeFigureOut">
               <a:rPr lang="en-US" smtClean="0"/>
-              <a:t>6/17/2018</a:t>
+              <a:t>6/18/2018</a:t>
             </a:fld>
             <a:endParaRPr lang="en-US"/>
           </a:p>
@@ -2877,7 +2879,7 @@
           <a:p>
             <a:fld id="{384A29A4-78C8-47AB-BA06-22CB45938951}" type="datetime1">
               <a:rPr lang="en-US" smtClean="0"/>
-              <a:t>6/17/2018</a:t>
+              <a:t>6/18/2018</a:t>
             </a:fld>
             <a:endParaRPr lang="en-US"/>
           </a:p>
@@ -3072,7 +3074,7 @@
           <a:p>
             <a:fld id="{E1ED4ACF-2D82-46F2-A8E9-23963AA34E86}" type="datetime1">
               <a:rPr lang="en-US" smtClean="0"/>
-              <a:t>6/17/2018</a:t>
+              <a:t>6/18/2018</a:t>
             </a:fld>
             <a:endParaRPr lang="en-US"/>
           </a:p>
@@ -3256,7 +3258,7 @@
           <a:p>
             <a:fld id="{AE374B5B-21A0-4192-BF4C-38187F1A68D8}" type="datetime1">
               <a:rPr lang="en-US" smtClean="0"/>
-              <a:t>6/17/2018</a:t>
+              <a:t>6/18/2018</a:t>
             </a:fld>
             <a:endParaRPr lang="en-US"/>
           </a:p>
@@ -5597,7 +5599,7 @@
           <a:p>
             <a:fld id="{33B5CF7C-B333-48E1-A4A6-83A3C8B73AC0}" type="datetime1">
               <a:rPr lang="en-US" smtClean="0"/>
-              <a:t>6/17/2018</a:t>
+              <a:t>6/18/2018</a:t>
             </a:fld>
             <a:endParaRPr lang="en-US"/>
           </a:p>
@@ -6050,7 +6052,7 @@
           <a:p>
             <a:fld id="{AE320762-5CBF-4210-AB54-376B091119F8}" type="datetime1">
               <a:rPr lang="en-US" smtClean="0"/>
-              <a:t>6/17/2018</a:t>
+              <a:t>6/18/2018</a:t>
             </a:fld>
             <a:endParaRPr lang="en-US"/>
           </a:p>
@@ -6182,7 +6184,7 @@
           <a:p>
             <a:fld id="{7F0DB371-BF5F-4058-A212-1A908E4D2674}" type="datetime1">
               <a:rPr lang="en-US" smtClean="0"/>
-              <a:t>6/17/2018</a:t>
+              <a:t>6/18/2018</a:t>
             </a:fld>
             <a:endParaRPr lang="en-US"/>
           </a:p>
@@ -8115,7 +8117,7 @@
           <a:p>
             <a:fld id="{60A4083B-90AA-48CF-BAD5-00AA24D7F288}" type="datetime1">
               <a:rPr lang="en-US" smtClean="0"/>
-              <a:t>6/17/2018</a:t>
+              <a:t>6/18/2018</a:t>
             </a:fld>
             <a:endParaRPr lang="en-US"/>
           </a:p>
@@ -10374,7 +10376,7 @@
             <a:fld id="{F5BAF629-ECA2-4CF3-B790-9D9BDED98269}" type="datetime1">
               <a:rPr lang="en-US" smtClean="0"/>
               <a:pPr/>
-              <a:t>6/17/2018</a:t>
+              <a:t>6/18/2018</a:t>
             </a:fld>
             <a:endParaRPr lang="en-US"/>
           </a:p>
@@ -14669,7 +14671,7 @@
             <a:fld id="{B51B2453-8663-4C69-AF73-9FD7B1DEC5D0}" type="datetime1">
               <a:rPr lang="en-US" smtClean="0"/>
               <a:pPr/>
-              <a:t>6/17/2018</a:t>
+              <a:t>6/18/2018</a:t>
             </a:fld>
             <a:endParaRPr lang="en-US" dirty="0"/>
           </a:p>
@@ -16450,18 +16452,51 @@
             <a:endParaRPr lang="en-GB" dirty="0"/>
           </a:p>
           <a:p>
+            <a:pPr>
+              <a:buBlip>
+                <a:blip r:embed="rId2">
+                  <a:extLst>
+                    <a:ext uri="{96DAC541-7B7A-43D3-8B79-37D633B846F1}">
+                      <asvg:svgBlip xmlns:asvg="http://schemas.microsoft.com/office/drawing/2016/SVG/main" r:embed="rId3"/>
+                    </a:ext>
+                  </a:extLst>
+                </a:blip>
+              </a:buBlip>
+            </a:pPr>
             <a:r>
               <a:rPr lang="en-GB" dirty="0"/>
               <a:t>1 request = $$$$$</a:t>
             </a:r>
           </a:p>
           <a:p>
+            <a:pPr>
+              <a:buBlip>
+                <a:blip r:embed="rId2">
+                  <a:extLst>
+                    <a:ext uri="{96DAC541-7B7A-43D3-8B79-37D633B846F1}">
+                      <asvg:svgBlip xmlns:asvg="http://schemas.microsoft.com/office/drawing/2016/SVG/main" r:embed="rId3"/>
+                    </a:ext>
+                  </a:extLst>
+                </a:blip>
+              </a:buBlip>
+            </a:pPr>
             <a:r>
               <a:rPr lang="en-GB" dirty="0"/>
               <a:t>Internet connection required</a:t>
             </a:r>
           </a:p>
           <a:p>
+            <a:pPr>
+              <a:buBlip>
+                <a:blip r:embed="rId2">
+                  <a:extLst>
+                    <a:ext uri="{96DAC541-7B7A-43D3-8B79-37D633B846F1}">
+                      <asvg:svgBlip xmlns:asvg="http://schemas.microsoft.com/office/drawing/2016/SVG/main" r:embed="rId3"/>
+                    </a:ext>
+                  </a:extLst>
+                </a:blip>
+              </a:buBlip>
+            </a:pPr>
             <a:r>
               <a:rPr lang="en-GB" dirty="0"/>
               <a:t>Privacy?</a:t>
@@ -16564,7 +16599,7 @@
             <p:nvPr/>
           </p:nvPicPr>
           <p:blipFill>
-            <a:blip r:embed="rId2">
+            <a:blip r:embed="rId4">
               <a:extLst>
                 <a:ext uri="{28A0092B-C50C-407E-A947-70E740481C1C}">
                   <a14:useLocalDpi xmlns:a14="http://schemas.microsoft.com/office/drawing/2010/main" val="0"/>
@@ -16625,7 +16660,7 @@
         <p:spPr>
           <a:xfrm>
             <a:off x="8137321" y="3204594"/>
-            <a:ext cx="2827090" cy="338554"/>
+            <a:ext cx="2827090" cy="584775"/>
           </a:xfrm>
           <a:prstGeom prst="rect">
             <a:avLst/>
@@ -16641,7 +16676,7 @@
             <a:pPr algn="ctr"/>
             <a:r>
               <a:rPr lang="en-GB" sz="1600" dirty="0"/>
-              <a:t>Star Trek VR Game</a:t>
+              <a:t>A Star Trek VR Game uses IBM’s Watson Conversation</a:t>
             </a:r>
           </a:p>
         </p:txBody>
@@ -16809,6 +16844,261 @@
       </p:par>
     </p:tnLst>
   </p:timing>
+</p:sld>
+</file>
+
+<file path=ppt/slides/slide8.xml><?xml version="1.0" encoding="utf-8"?>
+<p:sld xmlns:a="http://schemas.openxmlformats.org/drawingml/2006/main" xmlns:r="http://schemas.openxmlformats.org/officeDocument/2006/relationships" xmlns:p="http://schemas.openxmlformats.org/presentationml/2006/main">
+  <p:cSld>
+    <p:spTree>
+      <p:nvGrpSpPr>
+        <p:cNvPr id="1" name=""/>
+        <p:cNvGrpSpPr/>
+        <p:nvPr/>
+      </p:nvGrpSpPr>
+      <p:grpSpPr>
+        <a:xfrm>
+          <a:off x="0" y="0"/>
+          <a:ext cx="0" cy="0"/>
+          <a:chOff x="0" y="0"/>
+          <a:chExt cx="0" cy="0"/>
+        </a:xfrm>
+      </p:grpSpPr>
+      <p:sp>
+        <p:nvSpPr>
+          <p:cNvPr id="2" name="Title 1">
+            <a:extLst>
+              <a:ext uri="{FF2B5EF4-FFF2-40B4-BE49-F238E27FC236}">
+                <a16:creationId xmlns:a16="http://schemas.microsoft.com/office/drawing/2014/main" id="{D338D272-BB5C-45B5-8164-842FEC2E3A37}"/>
+              </a:ext>
+            </a:extLst>
+          </p:cNvPr>
+          <p:cNvSpPr>
+            <a:spLocks noGrp="1"/>
+          </p:cNvSpPr>
+          <p:nvPr>
+            <p:ph type="title"/>
+          </p:nvPr>
+        </p:nvSpPr>
+        <p:spPr/>
+        <p:txBody>
+          <a:bodyPr/>
+          <a:lstStyle/>
+          <a:p>
+            <a:r>
+              <a:rPr lang="en-GB" dirty="0"/>
+              <a:t>Heart of the System: WordNet</a:t>
+            </a:r>
+          </a:p>
+        </p:txBody>
+      </p:sp>
+      <p:sp>
+        <p:nvSpPr>
+          <p:cNvPr id="3" name="Content Placeholder 2">
+            <a:extLst>
+              <a:ext uri="{FF2B5EF4-FFF2-40B4-BE49-F238E27FC236}">
+                <a16:creationId xmlns:a16="http://schemas.microsoft.com/office/drawing/2014/main" id="{ABCA3A50-ABAB-47CB-94E9-39BF0A823027}"/>
+              </a:ext>
+            </a:extLst>
+          </p:cNvPr>
+          <p:cNvSpPr>
+            <a:spLocks noGrp="1"/>
+          </p:cNvSpPr>
+          <p:nvPr>
+            <p:ph idx="1"/>
+          </p:nvPr>
+        </p:nvSpPr>
+        <p:spPr/>
+        <p:txBody>
+          <a:bodyPr/>
+          <a:lstStyle/>
+          <a:p>
+            <a:r>
+              <a:rPr lang="en-GB" dirty="0"/>
+              <a:t>Created by Princeton University</a:t>
+            </a:r>
+          </a:p>
+          <a:p>
+            <a:r>
+              <a:rPr lang="en-GB" dirty="0"/>
+              <a:t>Large lexical database for the English language</a:t>
+            </a:r>
+          </a:p>
+          <a:p>
+            <a:r>
+              <a:rPr lang="en-GB" dirty="0"/>
+              <a:t>Huge tree of words</a:t>
+            </a:r>
+          </a:p>
+          <a:p>
+            <a:pPr lvl="1"/>
+            <a:r>
+              <a:rPr lang="en-GB" dirty="0"/>
+              <a:t>Each node is a set of synonyms (</a:t>
+            </a:r>
+            <a:r>
+              <a:rPr lang="en-GB" i="1" dirty="0" err="1"/>
+              <a:t>synset</a:t>
+            </a:r>
+            <a:r>
+              <a:rPr lang="en-GB" dirty="0"/>
+              <a:t>)</a:t>
+            </a:r>
+          </a:p>
+          <a:p>
+            <a:pPr lvl="1"/>
+            <a:r>
+              <a:rPr lang="en-GB" dirty="0"/>
+              <a:t>Parent nodes: hypernyms</a:t>
+            </a:r>
+            <a:endParaRPr lang="en-GB" i="1" dirty="0"/>
+          </a:p>
+        </p:txBody>
+      </p:sp>
+      <p:pic>
+        <p:nvPicPr>
+          <p:cNvPr id="4" name="Picture 3">
+            <a:extLst>
+              <a:ext uri="{FF2B5EF4-FFF2-40B4-BE49-F238E27FC236}">
+                <a16:creationId xmlns:a16="http://schemas.microsoft.com/office/drawing/2014/main" id="{EE729EE1-A6C5-4B62-B6D8-D201C02196C4}"/>
+              </a:ext>
+            </a:extLst>
+          </p:cNvPr>
+          <p:cNvPicPr>
+            <a:picLocks noChangeAspect="1"/>
+          </p:cNvPicPr>
+          <p:nvPr/>
+        </p:nvPicPr>
+        <p:blipFill>
+          <a:blip r:embed="rId3"/>
+          <a:stretch>
+            <a:fillRect/>
+          </a:stretch>
+        </p:blipFill>
+        <p:spPr>
+          <a:xfrm>
+            <a:off x="7185648" y="2549066"/>
+            <a:ext cx="3525930" cy="2064879"/>
+          </a:xfrm>
+          <a:prstGeom prst="rect">
+            <a:avLst/>
+          </a:prstGeom>
+          <a:ln>
+            <a:solidFill>
+              <a:schemeClr val="tx1"/>
+            </a:solidFill>
+          </a:ln>
+        </p:spPr>
+      </p:pic>
+    </p:spTree>
+    <p:extLst>
+      <p:ext uri="{BB962C8B-B14F-4D97-AF65-F5344CB8AC3E}">
+        <p14:creationId xmlns:p14="http://schemas.microsoft.com/office/powerpoint/2010/main" val="138724936"/>
+      </p:ext>
+    </p:extLst>
+  </p:cSld>
+  <p:clrMapOvr>
+    <a:masterClrMapping/>
+  </p:clrMapOvr>
+  <mc:AlternateContent xmlns:mc="http://schemas.openxmlformats.org/markup-compatibility/2006" xmlns:p14="http://schemas.microsoft.com/office/powerpoint/2010/main">
+    <mc:Choice Requires="p14">
+      <p:transition p14:dur="0"/>
+    </mc:Choice>
+    <mc:Fallback xmlns="">
+      <p:transition/>
+    </mc:Fallback>
+  </mc:AlternateContent>
+</p:sld>
+</file>
+
+<file path=ppt/slides/slide9.xml><?xml version="1.0" encoding="utf-8"?>
+<p:sld xmlns:a="http://schemas.openxmlformats.org/drawingml/2006/main" xmlns:r="http://schemas.openxmlformats.org/officeDocument/2006/relationships" xmlns:p="http://schemas.openxmlformats.org/presentationml/2006/main">
+  <p:cSld>
+    <p:spTree>
+      <p:nvGrpSpPr>
+        <p:cNvPr id="1" name=""/>
+        <p:cNvGrpSpPr/>
+        <p:nvPr/>
+      </p:nvGrpSpPr>
+      <p:grpSpPr>
+        <a:xfrm>
+          <a:off x="0" y="0"/>
+          <a:ext cx="0" cy="0"/>
+          <a:chOff x="0" y="0"/>
+          <a:chExt cx="0" cy="0"/>
+        </a:xfrm>
+      </p:grpSpPr>
+      <p:sp>
+        <p:nvSpPr>
+          <p:cNvPr id="2" name="Title 1">
+            <a:extLst>
+              <a:ext uri="{FF2B5EF4-FFF2-40B4-BE49-F238E27FC236}">
+                <a16:creationId xmlns:a16="http://schemas.microsoft.com/office/drawing/2014/main" id="{D3367E90-14A5-47CB-9ED0-22427C340567}"/>
+              </a:ext>
+            </a:extLst>
+          </p:cNvPr>
+          <p:cNvSpPr>
+            <a:spLocks noGrp="1"/>
+          </p:cNvSpPr>
+          <p:nvPr>
+            <p:ph type="title"/>
+          </p:nvPr>
+        </p:nvSpPr>
+        <p:spPr/>
+        <p:txBody>
+          <a:bodyPr/>
+          <a:lstStyle/>
+          <a:p>
+            <a:r>
+              <a:rPr lang="en-GB" dirty="0"/>
+              <a:t>RPG Demo</a:t>
+            </a:r>
+          </a:p>
+        </p:txBody>
+      </p:sp>
+      <p:sp>
+        <p:nvSpPr>
+          <p:cNvPr id="3" name="Content Placeholder 2">
+            <a:extLst>
+              <a:ext uri="{FF2B5EF4-FFF2-40B4-BE49-F238E27FC236}">
+                <a16:creationId xmlns:a16="http://schemas.microsoft.com/office/drawing/2014/main" id="{CB61A022-D35C-483A-B831-A81D94FF146F}"/>
+              </a:ext>
+            </a:extLst>
+          </p:cNvPr>
+          <p:cNvSpPr>
+            <a:spLocks noGrp="1"/>
+          </p:cNvSpPr>
+          <p:nvPr>
+            <p:ph idx="1"/>
+          </p:nvPr>
+        </p:nvSpPr>
+        <p:spPr/>
+        <p:txBody>
+          <a:bodyPr/>
+          <a:lstStyle/>
+          <a:p>
+            <a:endParaRPr lang="en-GB"/>
+          </a:p>
+        </p:txBody>
+      </p:sp>
+    </p:spTree>
+    <p:extLst>
+      <p:ext uri="{BB962C8B-B14F-4D97-AF65-F5344CB8AC3E}">
+        <p14:creationId xmlns:p14="http://schemas.microsoft.com/office/powerpoint/2010/main" val="795933033"/>
+      </p:ext>
+    </p:extLst>
+  </p:cSld>
+  <p:clrMapOvr>
+    <a:masterClrMapping/>
+  </p:clrMapOvr>
+  <mc:AlternateContent xmlns:mc="http://schemas.openxmlformats.org/markup-compatibility/2006">
+    <mc:Choice xmlns:p14="http://schemas.microsoft.com/office/powerpoint/2010/main" Requires="p14">
+      <p:transition p14:dur="0"/>
+    </mc:Choice>
+    <mc:Fallback>
+      <p:transition/>
+    </mc:Fallback>
+  </mc:AlternateContent>
 </p:sld>
 </file>
 

</xml_diff>

<commit_message>
Update gradle and presentation
</commit_message>
<xml_diff>
--- a/presentation/presentation.pptx
+++ b/presentation/presentation.pptx
@@ -18,8 +18,8 @@
     <p:sldId id="264" r:id="rId6"/>
     <p:sldId id="265" r:id="rId7"/>
     <p:sldId id="266" r:id="rId8"/>
-    <p:sldId id="267" r:id="rId9"/>
-    <p:sldId id="268" r:id="rId10"/>
+    <p:sldId id="268" r:id="rId9"/>
+    <p:sldId id="267" r:id="rId10"/>
   </p:sldIdLst>
   <p:sldSz cx="12192000" cy="6858000"/>
   <p:notesSz cx="6858000" cy="9144000"/>
@@ -16869,6 +16869,122 @@
           <p:cNvPr id="2" name="Title 1">
             <a:extLst>
               <a:ext uri="{FF2B5EF4-FFF2-40B4-BE49-F238E27FC236}">
+                <a16:creationId xmlns:a16="http://schemas.microsoft.com/office/drawing/2014/main" id="{D3367E90-14A5-47CB-9ED0-22427C340567}"/>
+              </a:ext>
+            </a:extLst>
+          </p:cNvPr>
+          <p:cNvSpPr>
+            <a:spLocks noGrp="1"/>
+          </p:cNvSpPr>
+          <p:nvPr>
+            <p:ph type="title"/>
+          </p:nvPr>
+        </p:nvSpPr>
+        <p:spPr/>
+        <p:txBody>
+          <a:bodyPr/>
+          <a:lstStyle/>
+          <a:p>
+            <a:r>
+              <a:rPr lang="en-GB" dirty="0"/>
+              <a:t>RPG Demo</a:t>
+            </a:r>
+          </a:p>
+        </p:txBody>
+      </p:sp>
+      <p:sp>
+        <p:nvSpPr>
+          <p:cNvPr id="3" name="Content Placeholder 2">
+            <a:extLst>
+              <a:ext uri="{FF2B5EF4-FFF2-40B4-BE49-F238E27FC236}">
+                <a16:creationId xmlns:a16="http://schemas.microsoft.com/office/drawing/2014/main" id="{CB61A022-D35C-483A-B831-A81D94FF146F}"/>
+              </a:ext>
+            </a:extLst>
+          </p:cNvPr>
+          <p:cNvSpPr>
+            <a:spLocks noGrp="1"/>
+          </p:cNvSpPr>
+          <p:nvPr>
+            <p:ph idx="1"/>
+          </p:nvPr>
+        </p:nvSpPr>
+        <p:spPr/>
+        <p:txBody>
+          <a:bodyPr/>
+          <a:lstStyle/>
+          <a:p>
+            <a:r>
+              <a:rPr lang="en-GB" dirty="0"/>
+              <a:t>Two different gameplay styles:</a:t>
+            </a:r>
+          </a:p>
+          <a:p>
+            <a:pPr lvl="1"/>
+            <a:r>
+              <a:rPr lang="en-GB" dirty="0"/>
+              <a:t>Exploration – interacting with objects (</a:t>
+            </a:r>
+            <a:r>
+              <a:rPr lang="en-GB" dirty="0" err="1"/>
+              <a:t>Zork</a:t>
+            </a:r>
+            <a:r>
+              <a:rPr lang="en-GB" dirty="0"/>
+              <a:t>, point-and-click adventure games)</a:t>
+            </a:r>
+          </a:p>
+          <a:p>
+            <a:pPr lvl="1"/>
+            <a:r>
+              <a:rPr lang="en-GB" dirty="0"/>
+              <a:t>Turn-based – fighting enemies (Pokémon, Final Fantasy)</a:t>
+            </a:r>
+          </a:p>
+        </p:txBody>
+      </p:sp>
+    </p:spTree>
+    <p:extLst>
+      <p:ext uri="{BB962C8B-B14F-4D97-AF65-F5344CB8AC3E}">
+        <p14:creationId xmlns:p14="http://schemas.microsoft.com/office/powerpoint/2010/main" val="795933033"/>
+      </p:ext>
+    </p:extLst>
+  </p:cSld>
+  <p:clrMapOvr>
+    <a:masterClrMapping/>
+  </p:clrMapOvr>
+  <mc:AlternateContent xmlns:mc="http://schemas.openxmlformats.org/markup-compatibility/2006" xmlns:p14="http://schemas.microsoft.com/office/powerpoint/2010/main">
+    <mc:Choice Requires="p14">
+      <p:transition p14:dur="0"/>
+    </mc:Choice>
+    <mc:Fallback xmlns="">
+      <p:transition/>
+    </mc:Fallback>
+  </mc:AlternateContent>
+</p:sld>
+</file>
+
+<file path=ppt/slides/slide9.xml><?xml version="1.0" encoding="utf-8"?>
+<p:sld xmlns:a="http://schemas.openxmlformats.org/drawingml/2006/main" xmlns:r="http://schemas.openxmlformats.org/officeDocument/2006/relationships" xmlns:p="http://schemas.openxmlformats.org/presentationml/2006/main">
+  <p:cSld>
+    <p:spTree>
+      <p:nvGrpSpPr>
+        <p:cNvPr id="1" name=""/>
+        <p:cNvGrpSpPr/>
+        <p:nvPr/>
+      </p:nvGrpSpPr>
+      <p:grpSpPr>
+        <a:xfrm>
+          <a:off x="0" y="0"/>
+          <a:ext cx="0" cy="0"/>
+          <a:chOff x="0" y="0"/>
+          <a:chExt cx="0" cy="0"/>
+        </a:xfrm>
+      </p:grpSpPr>
+      <p:sp>
+        <p:nvSpPr>
+          <p:cNvPr id="2" name="Title 1">
+            <a:extLst>
+              <a:ext uri="{FF2B5EF4-FFF2-40B4-BE49-F238E27FC236}">
                 <a16:creationId xmlns:a16="http://schemas.microsoft.com/office/drawing/2014/main" id="{D338D272-BB5C-45B5-8164-842FEC2E3A37}"/>
               </a:ext>
             </a:extLst>
@@ -16970,7 +17086,7 @@
           <p:nvPr/>
         </p:nvPicPr>
         <p:blipFill>
-          <a:blip r:embed="rId3"/>
+          <a:blip r:embed="rId2"/>
           <a:stretch>
             <a:fillRect/>
           </a:stretch>
@@ -17005,97 +17121,6 @@
       <p:transition p14:dur="0"/>
     </mc:Choice>
     <mc:Fallback xmlns="">
-      <p:transition/>
-    </mc:Fallback>
-  </mc:AlternateContent>
-</p:sld>
-</file>
-
-<file path=ppt/slides/slide9.xml><?xml version="1.0" encoding="utf-8"?>
-<p:sld xmlns:a="http://schemas.openxmlformats.org/drawingml/2006/main" xmlns:r="http://schemas.openxmlformats.org/officeDocument/2006/relationships" xmlns:p="http://schemas.openxmlformats.org/presentationml/2006/main">
-  <p:cSld>
-    <p:spTree>
-      <p:nvGrpSpPr>
-        <p:cNvPr id="1" name=""/>
-        <p:cNvGrpSpPr/>
-        <p:nvPr/>
-      </p:nvGrpSpPr>
-      <p:grpSpPr>
-        <a:xfrm>
-          <a:off x="0" y="0"/>
-          <a:ext cx="0" cy="0"/>
-          <a:chOff x="0" y="0"/>
-          <a:chExt cx="0" cy="0"/>
-        </a:xfrm>
-      </p:grpSpPr>
-      <p:sp>
-        <p:nvSpPr>
-          <p:cNvPr id="2" name="Title 1">
-            <a:extLst>
-              <a:ext uri="{FF2B5EF4-FFF2-40B4-BE49-F238E27FC236}">
-                <a16:creationId xmlns:a16="http://schemas.microsoft.com/office/drawing/2014/main" id="{D3367E90-14A5-47CB-9ED0-22427C340567}"/>
-              </a:ext>
-            </a:extLst>
-          </p:cNvPr>
-          <p:cNvSpPr>
-            <a:spLocks noGrp="1"/>
-          </p:cNvSpPr>
-          <p:nvPr>
-            <p:ph type="title"/>
-          </p:nvPr>
-        </p:nvSpPr>
-        <p:spPr/>
-        <p:txBody>
-          <a:bodyPr/>
-          <a:lstStyle/>
-          <a:p>
-            <a:r>
-              <a:rPr lang="en-GB" dirty="0"/>
-              <a:t>RPG Demo</a:t>
-            </a:r>
-          </a:p>
-        </p:txBody>
-      </p:sp>
-      <p:sp>
-        <p:nvSpPr>
-          <p:cNvPr id="3" name="Content Placeholder 2">
-            <a:extLst>
-              <a:ext uri="{FF2B5EF4-FFF2-40B4-BE49-F238E27FC236}">
-                <a16:creationId xmlns:a16="http://schemas.microsoft.com/office/drawing/2014/main" id="{CB61A022-D35C-483A-B831-A81D94FF146F}"/>
-              </a:ext>
-            </a:extLst>
-          </p:cNvPr>
-          <p:cNvSpPr>
-            <a:spLocks noGrp="1"/>
-          </p:cNvSpPr>
-          <p:nvPr>
-            <p:ph idx="1"/>
-          </p:nvPr>
-        </p:nvSpPr>
-        <p:spPr/>
-        <p:txBody>
-          <a:bodyPr/>
-          <a:lstStyle/>
-          <a:p>
-            <a:endParaRPr lang="en-GB"/>
-          </a:p>
-        </p:txBody>
-      </p:sp>
-    </p:spTree>
-    <p:extLst>
-      <p:ext uri="{BB962C8B-B14F-4D97-AF65-F5344CB8AC3E}">
-        <p14:creationId xmlns:p14="http://schemas.microsoft.com/office/powerpoint/2010/main" val="795933033"/>
-      </p:ext>
-    </p:extLst>
-  </p:cSld>
-  <p:clrMapOvr>
-    <a:masterClrMapping/>
-  </p:clrMapOvr>
-  <mc:AlternateContent xmlns:mc="http://schemas.openxmlformats.org/markup-compatibility/2006">
-    <mc:Choice xmlns:p14="http://schemas.microsoft.com/office/powerpoint/2010/main" Requires="p14">
-      <p:transition p14:dur="0"/>
-    </mc:Choice>
-    <mc:Fallback>
       <p:transition/>
     </mc:Fallback>
   </mc:AlternateContent>

</xml_diff>